<commit_message>
Syed - March 01
</commit_message>
<xml_diff>
--- a/Containers.pptx
+++ b/Containers.pptx
@@ -8,11 +8,12 @@
     <p:sldId id="263" r:id="rId2"/>
     <p:sldId id="262" r:id="rId3"/>
     <p:sldId id="256" r:id="rId4"/>
-    <p:sldId id="257" r:id="rId5"/>
-    <p:sldId id="259" r:id="rId6"/>
-    <p:sldId id="258" r:id="rId7"/>
-    <p:sldId id="261" r:id="rId8"/>
-    <p:sldId id="260" r:id="rId9"/>
+    <p:sldId id="264" r:id="rId5"/>
+    <p:sldId id="257" r:id="rId6"/>
+    <p:sldId id="259" r:id="rId7"/>
+    <p:sldId id="258" r:id="rId8"/>
+    <p:sldId id="261" r:id="rId9"/>
+    <p:sldId id="260" r:id="rId10"/>
   </p:sldIdLst>
   <p:sldSz cx="12192000" cy="6858000"/>
   <p:notesSz cx="6858000" cy="9144000"/>
@@ -278,7 +279,7 @@
           <a:p>
             <a:fld id="{52F9E1C2-F3F1-4803-8C16-2B6434BC89B5}" type="datetimeFigureOut">
               <a:rPr lang="en-US" smtClean="0"/>
-              <a:t>2/7/2020</a:t>
+              <a:t>3/1/2020</a:t>
             </a:fld>
             <a:endParaRPr lang="en-US"/>
           </a:p>
@@ -476,7 +477,7 @@
           <a:p>
             <a:fld id="{52F9E1C2-F3F1-4803-8C16-2B6434BC89B5}" type="datetimeFigureOut">
               <a:rPr lang="en-US" smtClean="0"/>
-              <a:t>2/7/2020</a:t>
+              <a:t>3/1/2020</a:t>
             </a:fld>
             <a:endParaRPr lang="en-US"/>
           </a:p>
@@ -684,7 +685,7 @@
           <a:p>
             <a:fld id="{52F9E1C2-F3F1-4803-8C16-2B6434BC89B5}" type="datetimeFigureOut">
               <a:rPr lang="en-US" smtClean="0"/>
-              <a:t>2/7/2020</a:t>
+              <a:t>3/1/2020</a:t>
             </a:fld>
             <a:endParaRPr lang="en-US"/>
           </a:p>
@@ -882,7 +883,7 @@
           <a:p>
             <a:fld id="{52F9E1C2-F3F1-4803-8C16-2B6434BC89B5}" type="datetimeFigureOut">
               <a:rPr lang="en-US" smtClean="0"/>
-              <a:t>2/7/2020</a:t>
+              <a:t>3/1/2020</a:t>
             </a:fld>
             <a:endParaRPr lang="en-US"/>
           </a:p>
@@ -1157,7 +1158,7 @@
           <a:p>
             <a:fld id="{52F9E1C2-F3F1-4803-8C16-2B6434BC89B5}" type="datetimeFigureOut">
               <a:rPr lang="en-US" smtClean="0"/>
-              <a:t>2/7/2020</a:t>
+              <a:t>3/1/2020</a:t>
             </a:fld>
             <a:endParaRPr lang="en-US"/>
           </a:p>
@@ -1422,7 +1423,7 @@
           <a:p>
             <a:fld id="{52F9E1C2-F3F1-4803-8C16-2B6434BC89B5}" type="datetimeFigureOut">
               <a:rPr lang="en-US" smtClean="0"/>
-              <a:t>2/7/2020</a:t>
+              <a:t>3/1/2020</a:t>
             </a:fld>
             <a:endParaRPr lang="en-US"/>
           </a:p>
@@ -1834,7 +1835,7 @@
           <a:p>
             <a:fld id="{52F9E1C2-F3F1-4803-8C16-2B6434BC89B5}" type="datetimeFigureOut">
               <a:rPr lang="en-US" smtClean="0"/>
-              <a:t>2/7/2020</a:t>
+              <a:t>3/1/2020</a:t>
             </a:fld>
             <a:endParaRPr lang="en-US"/>
           </a:p>
@@ -1975,7 +1976,7 @@
           <a:p>
             <a:fld id="{52F9E1C2-F3F1-4803-8C16-2B6434BC89B5}" type="datetimeFigureOut">
               <a:rPr lang="en-US" smtClean="0"/>
-              <a:t>2/7/2020</a:t>
+              <a:t>3/1/2020</a:t>
             </a:fld>
             <a:endParaRPr lang="en-US"/>
           </a:p>
@@ -2088,7 +2089,7 @@
           <a:p>
             <a:fld id="{52F9E1C2-F3F1-4803-8C16-2B6434BC89B5}" type="datetimeFigureOut">
               <a:rPr lang="en-US" smtClean="0"/>
-              <a:t>2/7/2020</a:t>
+              <a:t>3/1/2020</a:t>
             </a:fld>
             <a:endParaRPr lang="en-US"/>
           </a:p>
@@ -2399,7 +2400,7 @@
           <a:p>
             <a:fld id="{52F9E1C2-F3F1-4803-8C16-2B6434BC89B5}" type="datetimeFigureOut">
               <a:rPr lang="en-US" smtClean="0"/>
-              <a:t>2/7/2020</a:t>
+              <a:t>3/1/2020</a:t>
             </a:fld>
             <a:endParaRPr lang="en-US"/>
           </a:p>
@@ -2687,7 +2688,7 @@
           <a:p>
             <a:fld id="{52F9E1C2-F3F1-4803-8C16-2B6434BC89B5}" type="datetimeFigureOut">
               <a:rPr lang="en-US" smtClean="0"/>
-              <a:t>2/7/2020</a:t>
+              <a:t>3/1/2020</a:t>
             </a:fld>
             <a:endParaRPr lang="en-US"/>
           </a:p>
@@ -2928,7 +2929,7 @@
           <a:p>
             <a:fld id="{52F9E1C2-F3F1-4803-8C16-2B6434BC89B5}" type="datetimeFigureOut">
               <a:rPr lang="en-US" smtClean="0"/>
-              <a:t>2/7/2020</a:t>
+              <a:t>3/1/2020</a:t>
             </a:fld>
             <a:endParaRPr lang="en-US"/>
           </a:p>
@@ -3865,6 +3866,71 @@
       </p:grpSpPr>
       <p:sp>
         <p:nvSpPr>
+          <p:cNvPr id="2" name="Title 1">
+            <a:extLst>
+              <a:ext uri="{FF2B5EF4-FFF2-40B4-BE49-F238E27FC236}">
+                <a16:creationId xmlns:a16="http://schemas.microsoft.com/office/drawing/2014/main" id="{7F5641E3-73EC-4FEB-869C-763AED6D3B66}"/>
+              </a:ext>
+            </a:extLst>
+          </p:cNvPr>
+          <p:cNvSpPr>
+            <a:spLocks noGrp="1"/>
+          </p:cNvSpPr>
+          <p:nvPr>
+            <p:ph type="title"/>
+          </p:nvPr>
+        </p:nvSpPr>
+        <p:spPr>
+          <a:xfrm>
+            <a:off x="838200" y="365125"/>
+            <a:ext cx="6344478" cy="562527"/>
+          </a:xfrm>
+        </p:spPr>
+        <p:txBody>
+          <a:bodyPr>
+            <a:normAutofit/>
+          </a:bodyPr>
+          <a:lstStyle/>
+          <a:p>
+            <a:r>
+              <a:rPr lang="en-US" sz="3200" b="1" u="sng" dirty="0"/>
+              <a:t>Containers Technology in GCP</a:t>
+            </a:r>
+          </a:p>
+        </p:txBody>
+      </p:sp>
+    </p:spTree>
+    <p:extLst>
+      <p:ext uri="{BB962C8B-B14F-4D97-AF65-F5344CB8AC3E}">
+        <p14:creationId xmlns:p14="http://schemas.microsoft.com/office/powerpoint/2010/main" val="3761296862"/>
+      </p:ext>
+    </p:extLst>
+  </p:cSld>
+  <p:clrMapOvr>
+    <a:masterClrMapping/>
+  </p:clrMapOvr>
+</p:sld>
+</file>
+
+<file path=ppt/slides/slide5.xml><?xml version="1.0" encoding="utf-8"?>
+<p:sld xmlns:a="http://schemas.openxmlformats.org/drawingml/2006/main" xmlns:r="http://schemas.openxmlformats.org/officeDocument/2006/relationships" xmlns:p="http://schemas.openxmlformats.org/presentationml/2006/main">
+  <p:cSld>
+    <p:spTree>
+      <p:nvGrpSpPr>
+        <p:cNvPr id="1" name=""/>
+        <p:cNvGrpSpPr/>
+        <p:nvPr/>
+      </p:nvGrpSpPr>
+      <p:grpSpPr>
+        <a:xfrm>
+          <a:off x="0" y="0"/>
+          <a:ext cx="0" cy="0"/>
+          <a:chOff x="0" y="0"/>
+          <a:chExt cx="0" cy="0"/>
+        </a:xfrm>
+      </p:grpSpPr>
+      <p:sp>
+        <p:nvSpPr>
           <p:cNvPr id="5" name="TextBox 4">
             <a:extLst>
               <a:ext uri="{FF2B5EF4-FFF2-40B4-BE49-F238E27FC236}">
@@ -3997,7 +4063,7 @@
 </p:sld>
 </file>
 
-<file path=ppt/slides/slide5.xml><?xml version="1.0" encoding="utf-8"?>
+<file path=ppt/slides/slide6.xml><?xml version="1.0" encoding="utf-8"?>
 <p:sld xmlns:a="http://schemas.openxmlformats.org/drawingml/2006/main" xmlns:r="http://schemas.openxmlformats.org/officeDocument/2006/relationships" xmlns:p="http://schemas.openxmlformats.org/presentationml/2006/main">
   <p:cSld>
     <p:spTree>
@@ -4127,7 +4193,7 @@
 </p:sld>
 </file>
 
-<file path=ppt/slides/slide6.xml><?xml version="1.0" encoding="utf-8"?>
+<file path=ppt/slides/slide7.xml><?xml version="1.0" encoding="utf-8"?>
 <p:sld xmlns:a="http://schemas.openxmlformats.org/drawingml/2006/main" xmlns:r="http://schemas.openxmlformats.org/officeDocument/2006/relationships" xmlns:p="http://schemas.openxmlformats.org/presentationml/2006/main">
   <p:cSld>
     <p:spTree>
@@ -4243,7 +4309,7 @@
 </p:sld>
 </file>
 
-<file path=ppt/slides/slide7.xml><?xml version="1.0" encoding="utf-8"?>
+<file path=ppt/slides/slide8.xml><?xml version="1.0" encoding="utf-8"?>
 <p:sld xmlns:a="http://schemas.openxmlformats.org/drawingml/2006/main" xmlns:r="http://schemas.openxmlformats.org/officeDocument/2006/relationships" xmlns:p="http://schemas.openxmlformats.org/presentationml/2006/main">
   <p:cSld>
     <p:spTree>
@@ -4373,7 +4439,7 @@
 </p:sld>
 </file>
 
-<file path=ppt/slides/slide8.xml><?xml version="1.0" encoding="utf-8"?>
+<file path=ppt/slides/slide9.xml><?xml version="1.0" encoding="utf-8"?>
 <p:sld xmlns:a="http://schemas.openxmlformats.org/drawingml/2006/main" xmlns:r="http://schemas.openxmlformats.org/officeDocument/2006/relationships" xmlns:p="http://schemas.openxmlformats.org/presentationml/2006/main">
   <p:cSld>
     <p:spTree>

</xml_diff>